<commit_message>
Update Windows AU Demo Tutorial.
</commit_message>
<xml_diff>
--- a/Guide.pptx
+++ b/Guide.pptx
@@ -9,8 +9,9 @@
     <p:sldId id="257" r:id="rId3"/>
     <p:sldId id="258" r:id="rId4"/>
     <p:sldId id="259" r:id="rId5"/>
-    <p:sldId id="260" r:id="rId6"/>
-    <p:sldId id="261" r:id="rId7"/>
+    <p:sldId id="262" r:id="rId6"/>
+    <p:sldId id="260" r:id="rId7"/>
+    <p:sldId id="261" r:id="rId8"/>
   </p:sldIdLst>
   <p:sldSz cx="12192000" cy="6858000"/>
   <p:notesSz cx="6858000" cy="9144000"/>
@@ -3915,7 +3916,7 @@
         </p:blipFill>
         <p:spPr>
           <a:xfrm>
-            <a:off x="766618" y="2345638"/>
+            <a:off x="766618" y="1883820"/>
             <a:ext cx="5442444" cy="3431395"/>
           </a:xfrm>
           <a:prstGeom prst="rect">
@@ -3945,7 +3946,7 @@
         </p:blipFill>
         <p:spPr>
           <a:xfrm>
-            <a:off x="6292664" y="2345637"/>
+            <a:off x="6292664" y="1883819"/>
             <a:ext cx="4798538" cy="3431395"/>
           </a:xfrm>
           <a:prstGeom prst="rect">
@@ -3967,8 +3968,8 @@
         </p:nvSpPr>
         <p:spPr>
           <a:xfrm>
-            <a:off x="683490" y="6077527"/>
-            <a:ext cx="10407711" cy="646331"/>
+            <a:off x="683490" y="5411299"/>
+            <a:ext cx="10407711" cy="1477328"/>
           </a:xfrm>
           <a:prstGeom prst="rect">
             <a:avLst/>
@@ -3987,7 +3988,7 @@
                   <a:srgbClr val="FF0000"/>
                 </a:solidFill>
               </a:rPr>
-              <a:t>Alternatively, you can also use a custom face alignment algorithm to perform alignment</a:t>
+              <a:t>Alternatively, you can also use a custom face alignment algorithm to perform alignment.</a:t>
             </a:r>
           </a:p>
           <a:p>
@@ -3999,6 +4000,18 @@
               </a:rPr>
               <a:t>Recommended image names: 1.jpg, 2.jpg, 3.jpg...</a:t>
             </a:r>
+          </a:p>
+          <a:p>
+            <a:r>
+              <a:rPr lang="en-US" altLang="zh-CN" b="1" i="1" dirty="0">
+                <a:solidFill>
+                  <a:srgbClr val="FF0000"/>
+                </a:solidFill>
+              </a:rPr>
+              <a:t>In addition, we recommend reserving more forehead area for better recognition of AU1 and AU2, and more neck area for better recognition of AU26/27.</a:t>
+            </a:r>
+          </a:p>
+          <a:p>
             <a:endParaRPr lang="zh-CN" altLang="en-US" b="1" i="1" dirty="0">
               <a:solidFill>
                 <a:srgbClr val="FF0000"/>
@@ -4170,7 +4183,7 @@
         </p:blipFill>
         <p:spPr>
           <a:xfrm>
-            <a:off x="1840771" y="2068639"/>
+            <a:off x="1733186" y="2068639"/>
             <a:ext cx="8042138" cy="2644698"/>
           </a:xfrm>
           <a:prstGeom prst="rect">
@@ -4200,7 +4213,7 @@
         </p:blipFill>
         <p:spPr>
           <a:xfrm>
-            <a:off x="2259657" y="4705681"/>
+            <a:off x="1733186" y="4705681"/>
             <a:ext cx="7038109" cy="2096810"/>
           </a:xfrm>
           <a:prstGeom prst="rect">
@@ -4222,7 +4235,7 @@
         </p:nvCxnSpPr>
         <p:spPr>
           <a:xfrm flipV="1">
-            <a:off x="2133600" y="3205018"/>
+            <a:off x="2026015" y="3205018"/>
             <a:ext cx="4202546" cy="83127"/>
           </a:xfrm>
           <a:prstGeom prst="straightConnector1">
@@ -4264,8 +4277,8 @@
         </p:nvSpPr>
         <p:spPr>
           <a:xfrm>
-            <a:off x="6336145" y="2964873"/>
-            <a:ext cx="3694545" cy="369332"/>
+            <a:off x="6228561" y="2232998"/>
+            <a:ext cx="3502464" cy="2308324"/>
           </a:xfrm>
           <a:prstGeom prst="rect">
             <a:avLst/>
@@ -4284,13 +4297,92 @@
                   <a:srgbClr val="FF0000"/>
                 </a:solidFill>
               </a:rPr>
-              <a:t>GPU is recommended for inference</a:t>
+              <a:t>GPU is recommended for inference.</a:t>
+            </a:r>
+          </a:p>
+          <a:p>
+            <a:r>
+              <a:rPr lang="en-US" altLang="zh-CN" dirty="0">
+                <a:solidFill>
+                  <a:srgbClr val="FF0000"/>
+                </a:solidFill>
+              </a:rPr>
+              <a:t>The demo machine does not come with a graphics card, so CPU mode is selected by default.</a:t>
+            </a:r>
+          </a:p>
+          <a:p>
+            <a:endParaRPr lang="en-US" altLang="zh-CN" dirty="0">
+              <a:solidFill>
+                <a:srgbClr val="FF0000"/>
+              </a:solidFill>
+            </a:endParaRPr>
+          </a:p>
+          <a:p>
+            <a:r>
+              <a:rPr lang="en-US" altLang="zh-CN" dirty="0">
+                <a:solidFill>
+                  <a:srgbClr val="FF0000"/>
+                </a:solidFill>
+              </a:rPr>
+              <a:t>When using the GPU, ‘</a:t>
+            </a:r>
+            <a:r>
+              <a:rPr lang="en-US" altLang="zh-CN" dirty="0" err="1">
+                <a:solidFill>
+                  <a:srgbClr val="FF0000"/>
+                </a:solidFill>
+              </a:rPr>
+              <a:t>cuda</a:t>
+            </a:r>
+            <a:r>
+              <a:rPr lang="en-US" altLang="zh-CN" dirty="0">
+                <a:solidFill>
+                  <a:srgbClr val="FF0000"/>
+                </a:solidFill>
+              </a:rPr>
+              <a:t>’ will be displayed.</a:t>
             </a:r>
             <a:endParaRPr lang="zh-CN" altLang="en-US" dirty="0">
               <a:solidFill>
                 <a:srgbClr val="FF0000"/>
               </a:solidFill>
             </a:endParaRPr>
+          </a:p>
+        </p:txBody>
+      </p:sp>
+      <p:sp>
+        <p:nvSpPr>
+          <p:cNvPr id="2" name="文本框 1">
+            <a:extLst>
+              <a:ext uri="{FF2B5EF4-FFF2-40B4-BE49-F238E27FC236}">
+                <a16:creationId xmlns:a16="http://schemas.microsoft.com/office/drawing/2014/main" id="{35D6A7DB-DF4F-068E-E7BC-7692DBA30BFF}"/>
+              </a:ext>
+            </a:extLst>
+          </p:cNvPr>
+          <p:cNvSpPr txBox="1"/>
+          <p:nvPr/>
+        </p:nvSpPr>
+        <p:spPr>
+          <a:xfrm rot="5400000">
+            <a:off x="8771295" y="5719626"/>
+            <a:ext cx="1234633" cy="369332"/>
+          </a:xfrm>
+          <a:prstGeom prst="rect">
+            <a:avLst/>
+          </a:prstGeom>
+          <a:noFill/>
+        </p:spPr>
+        <p:txBody>
+          <a:bodyPr wrap="none" rtlCol="0">
+            <a:spAutoFit/>
+          </a:bodyPr>
+          <a:lstStyle/>
+          <a:p>
+            <a:r>
+              <a:rPr lang="en-US" altLang="zh-CN" dirty="0"/>
+              <a:t>predict.csv</a:t>
+            </a:r>
+            <a:endParaRPr lang="zh-CN" altLang="en-US" dirty="0"/>
           </a:p>
         </p:txBody>
       </p:sp>
@@ -4308,6 +4400,452 @@
 </file>
 
 <file path=ppt/slides/slide5.xml><?xml version="1.0" encoding="utf-8"?>
+<p:sld xmlns:a="http://schemas.openxmlformats.org/drawingml/2006/main" xmlns:r="http://schemas.openxmlformats.org/officeDocument/2006/relationships" xmlns:p="http://schemas.openxmlformats.org/presentationml/2006/main">
+  <p:cSld>
+    <p:spTree>
+      <p:nvGrpSpPr>
+        <p:cNvPr id="1" name="">
+          <a:extLst>
+            <a:ext uri="{FF2B5EF4-FFF2-40B4-BE49-F238E27FC236}">
+              <a16:creationId xmlns:a16="http://schemas.microsoft.com/office/drawing/2014/main" id="{A74B418C-18F4-B91C-E913-D032F6552EB1}"/>
+            </a:ext>
+          </a:extLst>
+        </p:cNvPr>
+        <p:cNvGrpSpPr/>
+        <p:nvPr/>
+      </p:nvGrpSpPr>
+      <p:grpSpPr>
+        <a:xfrm>
+          <a:off x="0" y="0"/>
+          <a:ext cx="0" cy="0"/>
+          <a:chOff x="0" y="0"/>
+          <a:chExt cx="0" cy="0"/>
+        </a:xfrm>
+      </p:grpSpPr>
+      <p:sp>
+        <p:nvSpPr>
+          <p:cNvPr id="4" name="文本框 3">
+            <a:extLst>
+              <a:ext uri="{FF2B5EF4-FFF2-40B4-BE49-F238E27FC236}">
+                <a16:creationId xmlns:a16="http://schemas.microsoft.com/office/drawing/2014/main" id="{FC453327-95DE-667E-802D-AED8FDE57535}"/>
+              </a:ext>
+            </a:extLst>
+          </p:cNvPr>
+          <p:cNvSpPr txBox="1"/>
+          <p:nvPr/>
+        </p:nvSpPr>
+        <p:spPr>
+          <a:xfrm>
+            <a:off x="314036" y="332508"/>
+            <a:ext cx="6363855" cy="584775"/>
+          </a:xfrm>
+          <a:prstGeom prst="rect">
+            <a:avLst/>
+          </a:prstGeom>
+          <a:noFill/>
+        </p:spPr>
+        <p:txBody>
+          <a:bodyPr wrap="square" rtlCol="0">
+            <a:spAutoFit/>
+          </a:bodyPr>
+          <a:lstStyle/>
+          <a:p>
+            <a:r>
+              <a:rPr lang="en-US" altLang="zh-CN" sz="3200" b="1" dirty="0"/>
+              <a:t>3. Data analysis</a:t>
+            </a:r>
+            <a:endParaRPr lang="zh-CN" altLang="en-US" sz="3200" b="1" dirty="0"/>
+          </a:p>
+        </p:txBody>
+      </p:sp>
+      <p:pic>
+        <p:nvPicPr>
+          <p:cNvPr id="11" name="图片 10">
+            <a:extLst>
+              <a:ext uri="{FF2B5EF4-FFF2-40B4-BE49-F238E27FC236}">
+                <a16:creationId xmlns:a16="http://schemas.microsoft.com/office/drawing/2014/main" id="{7894255F-CD10-FED5-6E3A-84E7D26FCAE2}"/>
+              </a:ext>
+            </a:extLst>
+          </p:cNvPr>
+          <p:cNvPicPr>
+            <a:picLocks noChangeAspect="1"/>
+          </p:cNvPicPr>
+          <p:nvPr/>
+        </p:nvPicPr>
+        <p:blipFill>
+          <a:blip r:embed="rId2"/>
+          <a:stretch>
+            <a:fillRect/>
+          </a:stretch>
+        </p:blipFill>
+        <p:spPr>
+          <a:xfrm>
+            <a:off x="314036" y="992661"/>
+            <a:ext cx="11611300" cy="3459266"/>
+          </a:xfrm>
+          <a:prstGeom prst="rect">
+            <a:avLst/>
+          </a:prstGeom>
+        </p:spPr>
+      </p:pic>
+      <p:pic>
+        <p:nvPicPr>
+          <p:cNvPr id="3" name="图片 2">
+            <a:extLst>
+              <a:ext uri="{FF2B5EF4-FFF2-40B4-BE49-F238E27FC236}">
+                <a16:creationId xmlns:a16="http://schemas.microsoft.com/office/drawing/2014/main" id="{A2E7836A-C5FB-AD97-9B80-0249F06C3E6F}"/>
+              </a:ext>
+            </a:extLst>
+          </p:cNvPr>
+          <p:cNvPicPr>
+            <a:picLocks noChangeAspect="1"/>
+          </p:cNvPicPr>
+          <p:nvPr/>
+        </p:nvPicPr>
+        <p:blipFill>
+          <a:blip r:embed="rId3">
+            <a:extLst>
+              <a:ext uri="{28A0092B-C50C-407E-A947-70E740481C1C}">
+                <a14:useLocalDpi xmlns:a14="http://schemas.microsoft.com/office/drawing/2010/main" val="0"/>
+              </a:ext>
+            </a:extLst>
+          </a:blip>
+          <a:stretch>
+            <a:fillRect/>
+          </a:stretch>
+        </p:blipFill>
+        <p:spPr>
+          <a:xfrm>
+            <a:off x="314036" y="4417352"/>
+            <a:ext cx="2133600" cy="2133600"/>
+          </a:xfrm>
+          <a:prstGeom prst="rect">
+            <a:avLst/>
+          </a:prstGeom>
+        </p:spPr>
+      </p:pic>
+      <p:sp>
+        <p:nvSpPr>
+          <p:cNvPr id="6" name="文本框 5">
+            <a:extLst>
+              <a:ext uri="{FF2B5EF4-FFF2-40B4-BE49-F238E27FC236}">
+                <a16:creationId xmlns:a16="http://schemas.microsoft.com/office/drawing/2014/main" id="{920B1C85-AA7D-2A13-07B8-FCB29A7C15C6}"/>
+              </a:ext>
+            </a:extLst>
+          </p:cNvPr>
+          <p:cNvSpPr txBox="1"/>
+          <p:nvPr/>
+        </p:nvSpPr>
+        <p:spPr>
+          <a:xfrm>
+            <a:off x="0" y="6511760"/>
+            <a:ext cx="3131128" cy="369332"/>
+          </a:xfrm>
+          <a:prstGeom prst="rect">
+            <a:avLst/>
+          </a:prstGeom>
+          <a:noFill/>
+        </p:spPr>
+        <p:txBody>
+          <a:bodyPr wrap="square" rtlCol="0">
+            <a:spAutoFit/>
+          </a:bodyPr>
+          <a:lstStyle/>
+          <a:p>
+            <a:r>
+              <a:rPr lang="en-US" altLang="zh-CN" dirty="0"/>
+              <a:t>frame_det_00_00000</a:t>
+            </a:r>
+            <a:r>
+              <a:rPr lang="en-US" altLang="zh-CN" b="1" dirty="0">
+                <a:solidFill>
+                  <a:srgbClr val="FF0000"/>
+                </a:solidFill>
+              </a:rPr>
+              <a:t>9</a:t>
+            </a:r>
+            <a:r>
+              <a:rPr lang="en-US" altLang="zh-CN" dirty="0"/>
+              <a:t>.bmp</a:t>
+            </a:r>
+            <a:endParaRPr lang="zh-CN" altLang="en-US" dirty="0"/>
+          </a:p>
+        </p:txBody>
+      </p:sp>
+      <p:sp>
+        <p:nvSpPr>
+          <p:cNvPr id="7" name="矩形 6">
+            <a:extLst>
+              <a:ext uri="{FF2B5EF4-FFF2-40B4-BE49-F238E27FC236}">
+                <a16:creationId xmlns:a16="http://schemas.microsoft.com/office/drawing/2014/main" id="{74835DF0-040B-68E3-3119-CCBB1408ABC4}"/>
+              </a:ext>
+            </a:extLst>
+          </p:cNvPr>
+          <p:cNvSpPr/>
+          <p:nvPr/>
+        </p:nvSpPr>
+        <p:spPr>
+          <a:xfrm>
+            <a:off x="471055" y="3731491"/>
+            <a:ext cx="10972800" cy="120073"/>
+          </a:xfrm>
+          <a:prstGeom prst="rect">
+            <a:avLst/>
+          </a:prstGeom>
+          <a:noFill/>
+          <a:ln>
+            <a:solidFill>
+              <a:srgbClr val="FF0000"/>
+            </a:solidFill>
+          </a:ln>
+        </p:spPr>
+        <p:style>
+          <a:lnRef idx="2">
+            <a:schemeClr val="accent1">
+              <a:shade val="15000"/>
+            </a:schemeClr>
+          </a:lnRef>
+          <a:fillRef idx="1">
+            <a:schemeClr val="accent1"/>
+          </a:fillRef>
+          <a:effectRef idx="0">
+            <a:schemeClr val="accent1"/>
+          </a:effectRef>
+          <a:fontRef idx="minor">
+            <a:schemeClr val="lt1"/>
+          </a:fontRef>
+        </p:style>
+        <p:txBody>
+          <a:bodyPr rtlCol="0" anchor="ctr"/>
+          <a:lstStyle/>
+          <a:p>
+            <a:pPr algn="ctr"/>
+            <a:endParaRPr lang="zh-CN" altLang="en-US"/>
+          </a:p>
+        </p:txBody>
+      </p:sp>
+      <p:sp>
+        <p:nvSpPr>
+          <p:cNvPr id="9" name="文本框 8">
+            <a:extLst>
+              <a:ext uri="{FF2B5EF4-FFF2-40B4-BE49-F238E27FC236}">
+                <a16:creationId xmlns:a16="http://schemas.microsoft.com/office/drawing/2014/main" id="{C6701A9B-2A34-68C7-B805-A00C367F490B}"/>
+              </a:ext>
+            </a:extLst>
+          </p:cNvPr>
+          <p:cNvSpPr txBox="1"/>
+          <p:nvPr/>
+        </p:nvSpPr>
+        <p:spPr>
+          <a:xfrm>
+            <a:off x="2447636" y="4451927"/>
+            <a:ext cx="9605819" cy="1200329"/>
+          </a:xfrm>
+          <a:prstGeom prst="rect">
+            <a:avLst/>
+          </a:prstGeom>
+          <a:noFill/>
+        </p:spPr>
+        <p:txBody>
+          <a:bodyPr wrap="square" rtlCol="0">
+            <a:spAutoFit/>
+          </a:bodyPr>
+          <a:lstStyle/>
+          <a:p>
+            <a:r>
+              <a:rPr lang="en-US" altLang="zh-CN" dirty="0"/>
+              <a:t>1 means AU is active, 0 means not active.</a:t>
+            </a:r>
+          </a:p>
+          <a:p>
+            <a:r>
+              <a:rPr lang="en-US" altLang="zh-CN" dirty="0"/>
+              <a:t>Our prediction results suggest that frame </a:t>
+            </a:r>
+            <a:r>
+              <a:rPr lang="en-US" altLang="zh-CN" dirty="0">
+                <a:solidFill>
+                  <a:srgbClr val="FF0000"/>
+                </a:solidFill>
+              </a:rPr>
+              <a:t>9</a:t>
+            </a:r>
+            <a:r>
+              <a:rPr lang="en-US" altLang="zh-CN" dirty="0"/>
+              <a:t> may activate </a:t>
+            </a:r>
+            <a:r>
+              <a:rPr lang="en-US" altLang="zh-CN" dirty="0">
+                <a:solidFill>
+                  <a:srgbClr val="FF0000"/>
+                </a:solidFill>
+              </a:rPr>
+              <a:t>AU1, AU2, AU18, and AU25</a:t>
+            </a:r>
+            <a:r>
+              <a:rPr lang="en-US" altLang="zh-CN" dirty="0"/>
+              <a:t>. Missing AU5/27.</a:t>
+            </a:r>
+          </a:p>
+          <a:p>
+            <a:r>
+              <a:rPr lang="en-US" altLang="zh-CN" dirty="0" err="1"/>
+              <a:t>Openface</a:t>
+            </a:r>
+            <a:r>
+              <a:rPr lang="en-US" altLang="zh-CN" dirty="0"/>
+              <a:t> result: </a:t>
+            </a:r>
+            <a:r>
+              <a:rPr lang="en-US" altLang="zh-CN" dirty="0">
+                <a:solidFill>
+                  <a:srgbClr val="FF0000"/>
+                </a:solidFill>
+              </a:rPr>
+              <a:t>AU5</a:t>
+            </a:r>
+            <a:r>
+              <a:rPr lang="en-US" altLang="zh-CN" dirty="0">
+                <a:solidFill>
+                  <a:schemeClr val="accent6">
+                    <a:lumMod val="75000"/>
+                  </a:schemeClr>
+                </a:solidFill>
+              </a:rPr>
+              <a:t> </a:t>
+            </a:r>
+            <a:r>
+              <a:rPr lang="en-US" altLang="zh-CN" dirty="0"/>
+              <a:t>and </a:t>
+            </a:r>
+            <a:r>
+              <a:rPr lang="en-US" altLang="zh-CN" dirty="0">
+                <a:solidFill>
+                  <a:schemeClr val="accent6">
+                    <a:lumMod val="75000"/>
+                  </a:schemeClr>
+                </a:solidFill>
+              </a:rPr>
+              <a:t>AU17 (prediction error)</a:t>
+            </a:r>
+            <a:r>
+              <a:rPr lang="en-US" altLang="zh-CN" dirty="0"/>
+              <a:t> may be activated. Missing AU1/2/18/25/27.</a:t>
+            </a:r>
+            <a:endParaRPr lang="zh-CN" altLang="en-US" dirty="0"/>
+          </a:p>
+        </p:txBody>
+      </p:sp>
+      <p:pic>
+        <p:nvPicPr>
+          <p:cNvPr id="12" name="图片 11">
+            <a:extLst>
+              <a:ext uri="{FF2B5EF4-FFF2-40B4-BE49-F238E27FC236}">
+                <a16:creationId xmlns:a16="http://schemas.microsoft.com/office/drawing/2014/main" id="{39C71964-8619-34EF-E20A-96D469C0E57A}"/>
+              </a:ext>
+            </a:extLst>
+          </p:cNvPr>
+          <p:cNvPicPr>
+            <a:picLocks noChangeAspect="1"/>
+          </p:cNvPicPr>
+          <p:nvPr/>
+        </p:nvPicPr>
+        <p:blipFill>
+          <a:blip r:embed="rId4"/>
+          <a:stretch>
+            <a:fillRect/>
+          </a:stretch>
+        </p:blipFill>
+        <p:spPr>
+          <a:xfrm>
+            <a:off x="3536984" y="5637631"/>
+            <a:ext cx="7232328" cy="1234225"/>
+          </a:xfrm>
+          <a:prstGeom prst="rect">
+            <a:avLst/>
+          </a:prstGeom>
+        </p:spPr>
+      </p:pic>
+      <p:sp>
+        <p:nvSpPr>
+          <p:cNvPr id="15" name="文本框 14">
+            <a:extLst>
+              <a:ext uri="{FF2B5EF4-FFF2-40B4-BE49-F238E27FC236}">
+                <a16:creationId xmlns:a16="http://schemas.microsoft.com/office/drawing/2014/main" id="{F015EBE1-F856-629D-7684-C768D9A05D3A}"/>
+              </a:ext>
+            </a:extLst>
+          </p:cNvPr>
+          <p:cNvSpPr txBox="1"/>
+          <p:nvPr/>
+        </p:nvSpPr>
+        <p:spPr>
+          <a:xfrm rot="5400000">
+            <a:off x="10215069" y="6237185"/>
+            <a:ext cx="1440873" cy="369332"/>
+          </a:xfrm>
+          <a:prstGeom prst="rect">
+            <a:avLst/>
+          </a:prstGeom>
+          <a:noFill/>
+        </p:spPr>
+        <p:txBody>
+          <a:bodyPr wrap="square" rtlCol="0">
+            <a:spAutoFit/>
+          </a:bodyPr>
+          <a:lstStyle/>
+          <a:p>
+            <a:r>
+              <a:rPr lang="en-US" altLang="zh-CN" dirty="0" err="1"/>
+              <a:t>Openface</a:t>
+            </a:r>
+            <a:endParaRPr lang="zh-CN" altLang="en-US" dirty="0"/>
+          </a:p>
+        </p:txBody>
+      </p:sp>
+      <p:pic>
+        <p:nvPicPr>
+          <p:cNvPr id="17" name="图片 16">
+            <a:extLst>
+              <a:ext uri="{FF2B5EF4-FFF2-40B4-BE49-F238E27FC236}">
+                <a16:creationId xmlns:a16="http://schemas.microsoft.com/office/drawing/2014/main" id="{A13EC078-A258-7240-852C-690564F1743C}"/>
+              </a:ext>
+            </a:extLst>
+          </p:cNvPr>
+          <p:cNvPicPr>
+            <a:picLocks noChangeAspect="1"/>
+          </p:cNvPicPr>
+          <p:nvPr/>
+        </p:nvPicPr>
+        <p:blipFill>
+          <a:blip r:embed="rId5"/>
+          <a:stretch>
+            <a:fillRect/>
+          </a:stretch>
+        </p:blipFill>
+        <p:spPr>
+          <a:xfrm>
+            <a:off x="3121892" y="5643020"/>
+            <a:ext cx="428029" cy="1216714"/>
+          </a:xfrm>
+          <a:prstGeom prst="rect">
+            <a:avLst/>
+          </a:prstGeom>
+        </p:spPr>
+      </p:pic>
+    </p:spTree>
+    <p:extLst>
+      <p:ext uri="{BB962C8B-B14F-4D97-AF65-F5344CB8AC3E}">
+        <p14:creationId xmlns:p14="http://schemas.microsoft.com/office/powerpoint/2010/main" val="1743747088"/>
+      </p:ext>
+    </p:extLst>
+  </p:cSld>
+  <p:clrMapOvr>
+    <a:masterClrMapping/>
+  </p:clrMapOvr>
+</p:sld>
+</file>
+
+<file path=ppt/slides/slide6.xml><?xml version="1.0" encoding="utf-8"?>
 <p:sld xmlns:a="http://schemas.openxmlformats.org/drawingml/2006/main" xmlns:r="http://schemas.openxmlformats.org/officeDocument/2006/relationships" xmlns:p="http://schemas.openxmlformats.org/presentationml/2006/main">
   <p:cSld>
     <p:spTree>
@@ -4360,7 +4898,7 @@
           <a:p>
             <a:r>
               <a:rPr lang="en-US" altLang="zh-CN" sz="3200" b="1" dirty="0"/>
-              <a:t>3. Change parameters</a:t>
+              <a:t>4. Change parameters</a:t>
             </a:r>
             <a:endParaRPr lang="zh-CN" altLang="en-US" sz="3200" b="1" dirty="0"/>
           </a:p>
@@ -4470,7 +5008,7 @@
         </p:blipFill>
         <p:spPr>
           <a:xfrm>
-            <a:off x="230909" y="2698911"/>
+            <a:off x="230909" y="3539420"/>
             <a:ext cx="11730182" cy="1164198"/>
           </a:xfrm>
           <a:prstGeom prst="rect">
@@ -4491,7 +5029,7 @@
 </p:sld>
 </file>
 
-<file path=ppt/slides/slide6.xml><?xml version="1.0" encoding="utf-8"?>
+<file path=ppt/slides/slide7.xml><?xml version="1.0" encoding="utf-8"?>
 <p:sld xmlns:a="http://schemas.openxmlformats.org/drawingml/2006/main" xmlns:r="http://schemas.openxmlformats.org/officeDocument/2006/relationships" xmlns:p="http://schemas.openxmlformats.org/presentationml/2006/main">
   <p:cSld>
     <p:spTree>

</xml_diff>